<commit_message>
Project Activity slide added to presentation
</commit_message>
<xml_diff>
--- a/Project Documentation/JavaScript UI & DOM - Teamwork.pptx
+++ b/Project Documentation/JavaScript UI & DOM - Teamwork.pptx
@@ -12,6 +12,7 @@
     <p:sldId id="259" r:id="rId6"/>
     <p:sldId id="261" r:id="rId7"/>
     <p:sldId id="260" r:id="rId8"/>
+    <p:sldId id="263" r:id="rId9"/>
   </p:sldIdLst>
   <p:sldSz cx="9144000" cy="6858000" type="screen4x3"/>
   <p:notesSz cx="6858000" cy="9144000"/>
@@ -310,7 +311,7 @@
           <a:p>
             <a:fld id="{8B4A04E9-C7E5-4AA5-8B03-B2F167180DC5}" type="datetimeFigureOut">
               <a:rPr lang="bg-BG" smtClean="0"/>
-              <a:t>18.06.2014 г.</a:t>
+              <a:t>19.06.2014 г.</a:t>
             </a:fld>
             <a:endParaRPr lang="bg-BG"/>
           </a:p>
@@ -480,7 +481,7 @@
           <a:p>
             <a:fld id="{8B4A04E9-C7E5-4AA5-8B03-B2F167180DC5}" type="datetimeFigureOut">
               <a:rPr lang="bg-BG" smtClean="0"/>
-              <a:t>18.06.2014 г.</a:t>
+              <a:t>19.06.2014 г.</a:t>
             </a:fld>
             <a:endParaRPr lang="bg-BG"/>
           </a:p>
@@ -660,7 +661,7 @@
           <a:p>
             <a:fld id="{8B4A04E9-C7E5-4AA5-8B03-B2F167180DC5}" type="datetimeFigureOut">
               <a:rPr lang="bg-BG" smtClean="0"/>
-              <a:t>18.06.2014 г.</a:t>
+              <a:t>19.06.2014 г.</a:t>
             </a:fld>
             <a:endParaRPr lang="bg-BG"/>
           </a:p>
@@ -830,7 +831,7 @@
           <a:p>
             <a:fld id="{8B4A04E9-C7E5-4AA5-8B03-B2F167180DC5}" type="datetimeFigureOut">
               <a:rPr lang="bg-BG" smtClean="0"/>
-              <a:t>18.06.2014 г.</a:t>
+              <a:t>19.06.2014 г.</a:t>
             </a:fld>
             <a:endParaRPr lang="bg-BG"/>
           </a:p>
@@ -1076,7 +1077,7 @@
           <a:p>
             <a:fld id="{8B4A04E9-C7E5-4AA5-8B03-B2F167180DC5}" type="datetimeFigureOut">
               <a:rPr lang="bg-BG" smtClean="0"/>
-              <a:t>18.06.2014 г.</a:t>
+              <a:t>19.06.2014 г.</a:t>
             </a:fld>
             <a:endParaRPr lang="bg-BG"/>
           </a:p>
@@ -1364,7 +1365,7 @@
           <a:p>
             <a:fld id="{8B4A04E9-C7E5-4AA5-8B03-B2F167180DC5}" type="datetimeFigureOut">
               <a:rPr lang="bg-BG" smtClean="0"/>
-              <a:t>18.06.2014 г.</a:t>
+              <a:t>19.06.2014 г.</a:t>
             </a:fld>
             <a:endParaRPr lang="bg-BG"/>
           </a:p>
@@ -1786,7 +1787,7 @@
           <a:p>
             <a:fld id="{8B4A04E9-C7E5-4AA5-8B03-B2F167180DC5}" type="datetimeFigureOut">
               <a:rPr lang="bg-BG" smtClean="0"/>
-              <a:t>18.06.2014 г.</a:t>
+              <a:t>19.06.2014 г.</a:t>
             </a:fld>
             <a:endParaRPr lang="bg-BG"/>
           </a:p>
@@ -1904,7 +1905,7 @@
           <a:p>
             <a:fld id="{8B4A04E9-C7E5-4AA5-8B03-B2F167180DC5}" type="datetimeFigureOut">
               <a:rPr lang="bg-BG" smtClean="0"/>
-              <a:t>18.06.2014 г.</a:t>
+              <a:t>19.06.2014 г.</a:t>
             </a:fld>
             <a:endParaRPr lang="bg-BG"/>
           </a:p>
@@ -1999,7 +2000,7 @@
           <a:p>
             <a:fld id="{8B4A04E9-C7E5-4AA5-8B03-B2F167180DC5}" type="datetimeFigureOut">
               <a:rPr lang="bg-BG" smtClean="0"/>
-              <a:t>18.06.2014 г.</a:t>
+              <a:t>19.06.2014 г.</a:t>
             </a:fld>
             <a:endParaRPr lang="bg-BG"/>
           </a:p>
@@ -2276,7 +2277,7 @@
           <a:p>
             <a:fld id="{8B4A04E9-C7E5-4AA5-8B03-B2F167180DC5}" type="datetimeFigureOut">
               <a:rPr lang="bg-BG" smtClean="0"/>
-              <a:t>18.06.2014 г.</a:t>
+              <a:t>19.06.2014 г.</a:t>
             </a:fld>
             <a:endParaRPr lang="bg-BG"/>
           </a:p>
@@ -2529,7 +2530,7 @@
           <a:p>
             <a:fld id="{8B4A04E9-C7E5-4AA5-8B03-B2F167180DC5}" type="datetimeFigureOut">
               <a:rPr lang="bg-BG" smtClean="0"/>
-              <a:t>18.06.2014 г.</a:t>
+              <a:t>19.06.2014 г.</a:t>
             </a:fld>
             <a:endParaRPr lang="bg-BG"/>
           </a:p>
@@ -2742,7 +2743,7 @@
           <a:p>
             <a:fld id="{8B4A04E9-C7E5-4AA5-8B03-B2F167180DC5}" type="datetimeFigureOut">
               <a:rPr lang="bg-BG" smtClean="0"/>
-              <a:t>18.06.2014 г.</a:t>
+              <a:t>19.06.2014 г.</a:t>
             </a:fld>
             <a:endParaRPr lang="bg-BG"/>
           </a:p>
@@ -5609,6 +5610,229 @@
 </p:sld>
 </file>
 
+<file path=ppt/slides/slide8.xml><?xml version="1.0" encoding="utf-8"?>
+<p:sld xmlns:a="http://schemas.openxmlformats.org/drawingml/2006/main" xmlns:r="http://schemas.openxmlformats.org/officeDocument/2006/relationships" xmlns:p="http://schemas.openxmlformats.org/presentationml/2006/main">
+  <p:cSld>
+    <p:spTree>
+      <p:nvGrpSpPr>
+        <p:cNvPr id="1" name=""/>
+        <p:cNvGrpSpPr/>
+        <p:nvPr/>
+      </p:nvGrpSpPr>
+      <p:grpSpPr>
+        <a:xfrm>
+          <a:off x="0" y="0"/>
+          <a:ext cx="0" cy="0"/>
+          <a:chOff x="0" y="0"/>
+          <a:chExt cx="0" cy="0"/>
+        </a:xfrm>
+      </p:grpSpPr>
+      <p:sp>
+        <p:nvSpPr>
+          <p:cNvPr id="2" name="Title 1"/>
+          <p:cNvSpPr>
+            <a:spLocks noGrp="1"/>
+          </p:cNvSpPr>
+          <p:nvPr>
+            <p:ph type="title"/>
+          </p:nvPr>
+        </p:nvSpPr>
+        <p:spPr/>
+        <p:txBody>
+          <a:bodyPr/>
+          <a:lstStyle/>
+          <a:p>
+            <a:r>
+              <a:rPr lang="en-CA" b="1" dirty="0" smtClean="0">
+                <a:ln w="11430"/>
+                <a:gradFill>
+                  <a:gsLst>
+                    <a:gs pos="0">
+                      <a:schemeClr val="accent6">
+                        <a:tint val="90000"/>
+                        <a:satMod val="120000"/>
+                      </a:schemeClr>
+                    </a:gs>
+                    <a:gs pos="25000">
+                      <a:schemeClr val="accent6">
+                        <a:tint val="93000"/>
+                        <a:satMod val="120000"/>
+                      </a:schemeClr>
+                    </a:gs>
+                    <a:gs pos="50000">
+                      <a:schemeClr val="accent6">
+                        <a:shade val="89000"/>
+                        <a:satMod val="110000"/>
+                      </a:schemeClr>
+                    </a:gs>
+                    <a:gs pos="75000">
+                      <a:schemeClr val="accent6">
+                        <a:tint val="93000"/>
+                        <a:satMod val="120000"/>
+                      </a:schemeClr>
+                    </a:gs>
+                    <a:gs pos="100000">
+                      <a:schemeClr val="accent6">
+                        <a:tint val="90000"/>
+                        <a:satMod val="120000"/>
+                      </a:schemeClr>
+                    </a:gs>
+                  </a:gsLst>
+                  <a:lin ang="5400000"/>
+                </a:gradFill>
+                <a:effectLst>
+                  <a:outerShdw blurRad="80000" dist="40000" dir="5040000" algn="tl">
+                    <a:srgbClr val="000000">
+                      <a:alpha val="30000"/>
+                    </a:srgbClr>
+                  </a:outerShdw>
+                </a:effectLst>
+              </a:rPr>
+              <a:t>Project Activity</a:t>
+            </a:r>
+            <a:endParaRPr lang="bg-BG" b="1" dirty="0">
+              <a:ln w="11430"/>
+              <a:gradFill>
+                <a:gsLst>
+                  <a:gs pos="0">
+                    <a:schemeClr val="accent6">
+                      <a:tint val="90000"/>
+                      <a:satMod val="120000"/>
+                    </a:schemeClr>
+                  </a:gs>
+                  <a:gs pos="25000">
+                    <a:schemeClr val="accent6">
+                      <a:tint val="93000"/>
+                      <a:satMod val="120000"/>
+                    </a:schemeClr>
+                  </a:gs>
+                  <a:gs pos="50000">
+                    <a:schemeClr val="accent6">
+                      <a:shade val="89000"/>
+                      <a:satMod val="110000"/>
+                    </a:schemeClr>
+                  </a:gs>
+                  <a:gs pos="75000">
+                    <a:schemeClr val="accent6">
+                      <a:tint val="93000"/>
+                      <a:satMod val="120000"/>
+                    </a:schemeClr>
+                  </a:gs>
+                  <a:gs pos="100000">
+                    <a:schemeClr val="accent6">
+                      <a:tint val="90000"/>
+                      <a:satMod val="120000"/>
+                    </a:schemeClr>
+                  </a:gs>
+                </a:gsLst>
+                <a:lin ang="5400000"/>
+              </a:gradFill>
+              <a:effectLst>
+                <a:outerShdw blurRad="80000" dist="40000" dir="5040000" algn="tl">
+                  <a:srgbClr val="000000">
+                    <a:alpha val="30000"/>
+                  </a:srgbClr>
+                </a:outerShdw>
+              </a:effectLst>
+            </a:endParaRPr>
+          </a:p>
+        </p:txBody>
+      </p:sp>
+      <p:sp>
+        <p:nvSpPr>
+          <p:cNvPr id="3" name="Content Placeholder 2"/>
+          <p:cNvSpPr>
+            <a:spLocks noGrp="1"/>
+          </p:cNvSpPr>
+          <p:nvPr>
+            <p:ph idx="1"/>
+          </p:nvPr>
+        </p:nvSpPr>
+        <p:spPr/>
+        <p:txBody>
+          <a:bodyPr/>
+          <a:lstStyle/>
+          <a:p>
+            <a:r>
+              <a:rPr lang="en-US" dirty="0"/>
+              <a:t>Contributors activity: </a:t>
+            </a:r>
+            <a:r>
+              <a:rPr lang="en-US" dirty="0">
+                <a:hlinkClick r:id="rId2"/>
+              </a:rPr>
+              <a:t>http://goo.gl/KQO1rf</a:t>
+            </a:r>
+            <a:endParaRPr lang="en-US" dirty="0" smtClean="0"/>
+          </a:p>
+          <a:p>
+            <a:endParaRPr lang="en-US" sz="1600" dirty="0"/>
+          </a:p>
+          <a:p>
+            <a:r>
+              <a:rPr lang="en-US" dirty="0"/>
+              <a:t>Commits: </a:t>
+            </a:r>
+            <a:r>
+              <a:rPr lang="en-US" dirty="0">
+                <a:hlinkClick r:id="rId3"/>
+              </a:rPr>
+              <a:t>http://goo.gl/3wrlYx</a:t>
+            </a:r>
+            <a:endParaRPr lang="en-CA" dirty="0"/>
+          </a:p>
+        </p:txBody>
+      </p:sp>
+      <p:pic>
+        <p:nvPicPr>
+          <p:cNvPr id="4" name="Picture 3"/>
+          <p:cNvPicPr>
+            <a:picLocks noChangeAspect="1"/>
+          </p:cNvPicPr>
+          <p:nvPr/>
+        </p:nvPicPr>
+        <p:blipFill>
+          <a:blip r:embed="rId4">
+            <a:extLst>
+              <a:ext uri="{28A0092B-C50C-407E-A947-70E740481C1C}">
+                <a14:useLocalDpi xmlns:a14="http://schemas.microsoft.com/office/drawing/2010/main" val="0"/>
+              </a:ext>
+            </a:extLst>
+          </a:blip>
+          <a:stretch>
+            <a:fillRect/>
+          </a:stretch>
+        </p:blipFill>
+        <p:spPr>
+          <a:xfrm>
+            <a:off x="320678" y="3717032"/>
+            <a:ext cx="8502643" cy="2114354"/>
+          </a:xfrm>
+          <a:prstGeom prst="rect">
+            <a:avLst/>
+          </a:prstGeom>
+        </p:spPr>
+      </p:pic>
+    </p:spTree>
+    <p:extLst>
+      <p:ext uri="{BB962C8B-B14F-4D97-AF65-F5344CB8AC3E}">
+        <p14:creationId xmlns:p14="http://schemas.microsoft.com/office/powerpoint/2010/main" val="3918578876"/>
+      </p:ext>
+    </p:extLst>
+  </p:cSld>
+  <p:clrMapOvr>
+    <a:masterClrMapping/>
+  </p:clrMapOvr>
+  <p:timing>
+    <p:tnLst>
+      <p:par>
+        <p:cTn id="1" dur="indefinite" restart="never" nodeType="tmRoot"/>
+      </p:par>
+    </p:tnLst>
+  </p:timing>
+</p:sld>
+</file>
+
 <file path=ppt/theme/theme1.xml><?xml version="1.0" encoding="utf-8"?>
 <a:theme xmlns:a="http://schemas.openxmlformats.org/drawingml/2006/main" name="Office Theme">
   <a:themeElements>

</xml_diff>

<commit_message>
diagram update diagram added to presentation added pdf presentation
</commit_message>
<xml_diff>
--- a/Project Documentation/JavaScript UI & DOM - Teamwork.pptx
+++ b/Project Documentation/JavaScript UI & DOM - Teamwork.pptx
@@ -10,9 +10,10 @@
     <p:sldId id="257" r:id="rId4"/>
     <p:sldId id="262" r:id="rId5"/>
     <p:sldId id="259" r:id="rId6"/>
-    <p:sldId id="261" r:id="rId7"/>
-    <p:sldId id="260" r:id="rId8"/>
-    <p:sldId id="263" r:id="rId9"/>
+    <p:sldId id="264" r:id="rId7"/>
+    <p:sldId id="261" r:id="rId8"/>
+    <p:sldId id="260" r:id="rId9"/>
+    <p:sldId id="263" r:id="rId10"/>
   </p:sldIdLst>
   <p:sldSz cx="9144000" cy="6858000" type="screen4x3"/>
   <p:notesSz cx="6858000" cy="9144000"/>
@@ -5066,6 +5067,206 @@
       </p:grpSpPr>
       <p:sp>
         <p:nvSpPr>
+          <p:cNvPr id="7" name="Rectangle 6"/>
+          <p:cNvSpPr/>
+          <p:nvPr/>
+        </p:nvSpPr>
+        <p:spPr>
+          <a:xfrm>
+            <a:off x="1424153" y="410435"/>
+            <a:ext cx="6295699" cy="923330"/>
+          </a:xfrm>
+          <a:prstGeom prst="rect">
+            <a:avLst/>
+          </a:prstGeom>
+          <a:noFill/>
+        </p:spPr>
+        <p:txBody>
+          <a:bodyPr wrap="none" lIns="91440" tIns="45720" rIns="91440" bIns="45720">
+            <a:spAutoFit/>
+            <a:scene3d>
+              <a:camera prst="orthographicFront"/>
+              <a:lightRig rig="glow" dir="tl">
+                <a:rot lat="0" lon="0" rev="5400000"/>
+              </a:lightRig>
+            </a:scene3d>
+            <a:sp3d contourW="12700">
+              <a:bevelT w="25400" h="25400"/>
+              <a:contourClr>
+                <a:schemeClr val="accent6">
+                  <a:shade val="73000"/>
+                </a:schemeClr>
+              </a:contourClr>
+            </a:sp3d>
+          </a:bodyPr>
+          <a:lstStyle/>
+          <a:p>
+            <a:pPr algn="ctr"/>
+            <a:r>
+              <a:rPr lang="en-CA" sz="5400" b="1" cap="none" spc="0" dirty="0" smtClean="0">
+                <a:ln w="11430"/>
+                <a:gradFill>
+                  <a:gsLst>
+                    <a:gs pos="0">
+                      <a:schemeClr val="accent6">
+                        <a:tint val="90000"/>
+                        <a:satMod val="120000"/>
+                      </a:schemeClr>
+                    </a:gs>
+                    <a:gs pos="25000">
+                      <a:schemeClr val="accent6">
+                        <a:tint val="93000"/>
+                        <a:satMod val="120000"/>
+                      </a:schemeClr>
+                    </a:gs>
+                    <a:gs pos="50000">
+                      <a:schemeClr val="accent6">
+                        <a:shade val="89000"/>
+                        <a:satMod val="110000"/>
+                      </a:schemeClr>
+                    </a:gs>
+                    <a:gs pos="75000">
+                      <a:schemeClr val="accent6">
+                        <a:tint val="93000"/>
+                        <a:satMod val="120000"/>
+                      </a:schemeClr>
+                    </a:gs>
+                    <a:gs pos="100000">
+                      <a:schemeClr val="accent6">
+                        <a:tint val="90000"/>
+                        <a:satMod val="120000"/>
+                      </a:schemeClr>
+                    </a:gs>
+                  </a:gsLst>
+                  <a:lin ang="5400000"/>
+                </a:gradFill>
+                <a:effectLst>
+                  <a:outerShdw blurRad="80000" dist="40000" dir="5040000" algn="tl">
+                    <a:srgbClr val="000000">
+                      <a:alpha val="30000"/>
+                    </a:srgbClr>
+                  </a:outerShdw>
+                </a:effectLst>
+              </a:rPr>
+              <a:t>Project UML Diagram</a:t>
+            </a:r>
+            <a:endParaRPr lang="bg-BG" sz="5400" b="1" cap="none" spc="0" dirty="0">
+              <a:ln w="11430"/>
+              <a:gradFill>
+                <a:gsLst>
+                  <a:gs pos="0">
+                    <a:schemeClr val="accent6">
+                      <a:tint val="90000"/>
+                      <a:satMod val="120000"/>
+                    </a:schemeClr>
+                  </a:gs>
+                  <a:gs pos="25000">
+                    <a:schemeClr val="accent6">
+                      <a:tint val="93000"/>
+                      <a:satMod val="120000"/>
+                    </a:schemeClr>
+                  </a:gs>
+                  <a:gs pos="50000">
+                    <a:schemeClr val="accent6">
+                      <a:shade val="89000"/>
+                      <a:satMod val="110000"/>
+                    </a:schemeClr>
+                  </a:gs>
+                  <a:gs pos="75000">
+                    <a:schemeClr val="accent6">
+                      <a:tint val="93000"/>
+                      <a:satMod val="120000"/>
+                    </a:schemeClr>
+                  </a:gs>
+                  <a:gs pos="100000">
+                    <a:schemeClr val="accent6">
+                      <a:tint val="90000"/>
+                      <a:satMod val="120000"/>
+                    </a:schemeClr>
+                  </a:gs>
+                </a:gsLst>
+                <a:lin ang="5400000"/>
+              </a:gradFill>
+              <a:effectLst>
+                <a:outerShdw blurRad="80000" dist="40000" dir="5040000" algn="tl">
+                  <a:srgbClr val="000000">
+                    <a:alpha val="30000"/>
+                  </a:srgbClr>
+                </a:outerShdw>
+              </a:effectLst>
+            </a:endParaRPr>
+          </a:p>
+        </p:txBody>
+      </p:sp>
+      <p:pic>
+        <p:nvPicPr>
+          <p:cNvPr id="6" name="Picture 5"/>
+          <p:cNvPicPr>
+            <a:picLocks noChangeAspect="1"/>
+          </p:cNvPicPr>
+          <p:nvPr/>
+        </p:nvPicPr>
+        <p:blipFill>
+          <a:blip r:embed="rId2">
+            <a:extLst>
+              <a:ext uri="{28A0092B-C50C-407E-A947-70E740481C1C}">
+                <a14:useLocalDpi xmlns:a14="http://schemas.microsoft.com/office/drawing/2010/main" val="0"/>
+              </a:ext>
+            </a:extLst>
+          </a:blip>
+          <a:stretch>
+            <a:fillRect/>
+          </a:stretch>
+        </p:blipFill>
+        <p:spPr>
+          <a:xfrm>
+            <a:off x="897953" y="1464731"/>
+            <a:ext cx="7348097" cy="5373216"/>
+          </a:xfrm>
+          <a:prstGeom prst="rect">
+            <a:avLst/>
+          </a:prstGeom>
+        </p:spPr>
+      </p:pic>
+    </p:spTree>
+    <p:extLst>
+      <p:ext uri="{BB962C8B-B14F-4D97-AF65-F5344CB8AC3E}">
+        <p14:creationId xmlns:p14="http://schemas.microsoft.com/office/powerpoint/2010/main" val="2521773399"/>
+      </p:ext>
+    </p:extLst>
+  </p:cSld>
+  <p:clrMapOvr>
+    <a:masterClrMapping/>
+  </p:clrMapOvr>
+  <p:timing>
+    <p:tnLst>
+      <p:par>
+        <p:cTn id="1" dur="indefinite" restart="never" nodeType="tmRoot"/>
+      </p:par>
+    </p:tnLst>
+  </p:timing>
+</p:sld>
+</file>
+
+<file path=ppt/slides/slide7.xml><?xml version="1.0" encoding="utf-8"?>
+<p:sld xmlns:a="http://schemas.openxmlformats.org/drawingml/2006/main" xmlns:r="http://schemas.openxmlformats.org/officeDocument/2006/relationships" xmlns:p="http://schemas.openxmlformats.org/presentationml/2006/main">
+  <p:cSld>
+    <p:spTree>
+      <p:nvGrpSpPr>
+        <p:cNvPr id="1" name=""/>
+        <p:cNvGrpSpPr/>
+        <p:nvPr/>
+      </p:nvGrpSpPr>
+      <p:grpSpPr>
+        <a:xfrm>
+          <a:off x="0" y="0"/>
+          <a:ext cx="0" cy="0"/>
+          <a:chOff x="0" y="0"/>
+          <a:chExt cx="0" cy="0"/>
+        </a:xfrm>
+      </p:grpSpPr>
+      <p:sp>
+        <p:nvSpPr>
           <p:cNvPr id="2" name="Title 1"/>
           <p:cNvSpPr>
             <a:spLocks noGrp="1"/>
@@ -5200,7 +5401,7 @@
 </p:sld>
 </file>
 
-<file path=ppt/slides/slide7.xml><?xml version="1.0" encoding="utf-8"?>
+<file path=ppt/slides/slide8.xml><?xml version="1.0" encoding="utf-8"?>
 <p:sld xmlns:a="http://schemas.openxmlformats.org/drawingml/2006/main" xmlns:r="http://schemas.openxmlformats.org/officeDocument/2006/relationships" xmlns:p="http://schemas.openxmlformats.org/presentationml/2006/main">
   <p:cSld>
     <p:spTree>
@@ -5610,7 +5811,7 @@
 </p:sld>
 </file>
 
-<file path=ppt/slides/slide8.xml><?xml version="1.0" encoding="utf-8"?>
+<file path=ppt/slides/slide9.xml><?xml version="1.0" encoding="utf-8"?>
 <p:sld xmlns:a="http://schemas.openxmlformats.org/drawingml/2006/main" xmlns:r="http://schemas.openxmlformats.org/officeDocument/2006/relationships" xmlns:p="http://schemas.openxmlformats.org/presentationml/2006/main">
   <p:cSld>
     <p:spTree>

</xml_diff>